<commit_message>
updates for Fall 2019
</commit_message>
<xml_diff>
--- a/L03-intersection.pptx
+++ b/L03-intersection.pptx
@@ -253,7 +253,7 @@
           <a:p>
             <a:fld id="{C787A165-4FDD-49E5-9F6D-D505BB88ABC6}" type="datetimeFigureOut">
               <a:rPr lang="en-US" smtClean="0"/>
-              <a:t>7/25/19</a:t>
+              <a:t>9/9/19</a:t>
             </a:fld>
             <a:endParaRPr lang="en-US"/>
           </a:p>
@@ -419,7 +419,7 @@
           <a:p>
             <a:fld id="{5D612DD9-5214-4F09-A917-0755DC49A4D5}" type="datetimeFigureOut">
               <a:rPr lang="en-US" smtClean="0"/>
-              <a:t>7/25/19</a:t>
+              <a:t>9/9/19</a:t>
             </a:fld>
             <a:endParaRPr lang="en-US"/>
           </a:p>
@@ -1633,7 +1633,7 @@
           </a:ln>
           <a:extLst>
             <a:ext uri="{909E8E84-426E-40dd-AFC4-6F175D3DCCD1}">
-              <a14:hiddenFill xmlns="" xmlns:a14="http://schemas.microsoft.com/office/drawing/2010/main">
+              <a14:hiddenFill xmlns:a14="http://schemas.microsoft.com/office/drawing/2010/main" xmlns="">
                 <a:solidFill>
                   <a:srgbClr val="FFFFFF"/>
                 </a:solidFill>
@@ -1679,7 +1679,7 @@
           </a:ln>
           <a:extLst>
             <a:ext uri="{909E8E84-426E-40dd-AFC4-6F175D3DCCD1}">
-              <a14:hiddenFill xmlns="" xmlns:a14="http://schemas.microsoft.com/office/drawing/2010/main">
+              <a14:hiddenFill xmlns:a14="http://schemas.microsoft.com/office/drawing/2010/main" xmlns="">
                 <a:solidFill>
                   <a:srgbClr val="FFFFFF"/>
                 </a:solidFill>
@@ -1725,7 +1725,7 @@
           </a:ln>
           <a:extLst>
             <a:ext uri="{909E8E84-426E-40dd-AFC4-6F175D3DCCD1}">
-              <a14:hiddenFill xmlns="" xmlns:a14="http://schemas.microsoft.com/office/drawing/2010/main">
+              <a14:hiddenFill xmlns:a14="http://schemas.microsoft.com/office/drawing/2010/main" xmlns="">
                 <a:solidFill>
                   <a:srgbClr val="FFFFFF"/>
                 </a:solidFill>
@@ -1769,7 +1769,7 @@
           </a:ln>
           <a:extLst>
             <a:ext uri="{909E8E84-426E-40dd-AFC4-6F175D3DCCD1}">
-              <a14:hiddenFill xmlns="" xmlns:a14="http://schemas.microsoft.com/office/drawing/2010/main">
+              <a14:hiddenFill xmlns:a14="http://schemas.microsoft.com/office/drawing/2010/main" xmlns="">
                 <a:solidFill>
                   <a:srgbClr val="FFFFFF"/>
                 </a:solidFill>
@@ -1815,7 +1815,7 @@
           </a:ln>
           <a:extLst>
             <a:ext uri="{909E8E84-426E-40dd-AFC4-6F175D3DCCD1}">
-              <a14:hiddenFill xmlns="" xmlns:a14="http://schemas.microsoft.com/office/drawing/2010/main">
+              <a14:hiddenFill xmlns:a14="http://schemas.microsoft.com/office/drawing/2010/main" xmlns="">
                 <a:solidFill>
                   <a:srgbClr val="FFFFFF"/>
                 </a:solidFill>
@@ -1861,7 +1861,7 @@
           </a:ln>
           <a:extLst>
             <a:ext uri="{909E8E84-426E-40dd-AFC4-6F175D3DCCD1}">
-              <a14:hiddenFill xmlns="" xmlns:a14="http://schemas.microsoft.com/office/drawing/2010/main">
+              <a14:hiddenFill xmlns:a14="http://schemas.microsoft.com/office/drawing/2010/main" xmlns="">
                 <a:solidFill>
                   <a:srgbClr val="FFFFFF"/>
                 </a:solidFill>
@@ -7491,7 +7491,7 @@
           <a:p>
             <a:fld id="{6E39BF48-6E0A-4E37-BB05-8DF70571673D}" type="datetimeFigureOut">
               <a:rPr lang="en-US" smtClean="0"/>
-              <a:t>7/25/19</a:t>
+              <a:t>9/9/19</a:t>
             </a:fld>
             <a:endParaRPr lang="en-US"/>
           </a:p>
@@ -28531,25 +28531,19 @@
           <a:p>
             <a:r>
               <a:rPr lang="en-US" altLang="en-US" dirty="0"/>
-              <a:t>	Compare rectangle x-interval to 			active set for overlap.</a:t>
+              <a:t>Compare rectangle x-interval to active set for overlap.</a:t>
             </a:r>
           </a:p>
           <a:p>
             <a:r>
               <a:rPr lang="en-US" altLang="en-US" dirty="0"/>
-              <a:t>	Add rectangle x-interval to active 		set.</a:t>
+              <a:t>Add rectangle x-interval to active set.</a:t>
             </a:r>
           </a:p>
           <a:p>
             <a:r>
               <a:rPr lang="en-US" altLang="en-US" dirty="0"/>
-              <a:t>At the ending interval:</a:t>
-            </a:r>
-          </a:p>
-          <a:p>
-            <a:r>
-              <a:rPr lang="en-US" altLang="en-US" dirty="0"/>
-              <a:t>	Remove rectangle X-interval from active set.</a:t>
+              <a:t>At the ending interval remove rectangle X-interval from active set.</a:t>
             </a:r>
           </a:p>
         </p:txBody>
@@ -38491,56 +38485,6 @@
           <a:chExt cx="0" cy="0"/>
         </a:xfrm>
       </p:grpSpPr>
-      <p:sp>
-        <p:nvSpPr>
-          <p:cNvPr id="2" name="Title 1">
-            <a:extLst>
-              <a:ext uri="{FF2B5EF4-FFF2-40B4-BE49-F238E27FC236}">
-                <a16:creationId xmlns:a16="http://schemas.microsoft.com/office/drawing/2014/main" id="{0914FEB4-D03F-8B45-8634-2DF18B96133F}"/>
-              </a:ext>
-            </a:extLst>
-          </p:cNvPr>
-          <p:cNvSpPr>
-            <a:spLocks noGrp="1"/>
-          </p:cNvSpPr>
-          <p:nvPr>
-            <p:ph type="title"/>
-          </p:nvPr>
-        </p:nvSpPr>
-        <p:spPr/>
-        <p:txBody>
-          <a:bodyPr/>
-          <a:lstStyle/>
-          <a:p>
-            <a:endParaRPr lang="en-US"/>
-          </a:p>
-        </p:txBody>
-      </p:sp>
-      <p:sp>
-        <p:nvSpPr>
-          <p:cNvPr id="3" name="Content Placeholder 2">
-            <a:extLst>
-              <a:ext uri="{FF2B5EF4-FFF2-40B4-BE49-F238E27FC236}">
-                <a16:creationId xmlns:a16="http://schemas.microsoft.com/office/drawing/2014/main" id="{80922B61-F77E-F44F-BBC3-7740B9F71DB6}"/>
-              </a:ext>
-            </a:extLst>
-          </p:cNvPr>
-          <p:cNvSpPr>
-            <a:spLocks noGrp="1"/>
-          </p:cNvSpPr>
-          <p:nvPr>
-            <p:ph idx="1"/>
-          </p:nvPr>
-        </p:nvSpPr>
-        <p:spPr/>
-        <p:txBody>
-          <a:bodyPr/>
-          <a:lstStyle/>
-          <a:p>
-            <a:endParaRPr lang="en-US"/>
-          </a:p>
-        </p:txBody>
-      </p:sp>
     </p:spTree>
     <p:extLst>
       <p:ext uri="{BB962C8B-B14F-4D97-AF65-F5344CB8AC3E}">

</xml_diff>